<commit_message>
add fileupload files and paging files
</commit_message>
<xml_diff>
--- a/src/main/info/1팀 2차 프로젝트(spring-boot).pptx
+++ b/src/main/info/1팀 2차 프로젝트(spring-boot).pptx
@@ -296,7 +296,7 @@
             <a:fld id="{00602777-EDDD-4E1C-9A25-53AA0F22EDF3}" type="datetimeFigureOut">
               <a:rPr lang="ko-KR" altLang="en-US" smtClean="0"/>
               <a:pPr/>
-              <a:t>2021-02-22</a:t>
+              <a:t>2021-02-28</a:t>
             </a:fld>
             <a:endParaRPr lang="ko-KR" altLang="en-US"/>
           </a:p>
@@ -463,7 +463,7 @@
             <a:fld id="{00602777-EDDD-4E1C-9A25-53AA0F22EDF3}" type="datetimeFigureOut">
               <a:rPr lang="ko-KR" altLang="en-US" smtClean="0"/>
               <a:pPr/>
-              <a:t>2021-02-22</a:t>
+              <a:t>2021-02-28</a:t>
             </a:fld>
             <a:endParaRPr lang="ko-KR" altLang="en-US"/>
           </a:p>
@@ -640,7 +640,7 @@
             <a:fld id="{00602777-EDDD-4E1C-9A25-53AA0F22EDF3}" type="datetimeFigureOut">
               <a:rPr lang="ko-KR" altLang="en-US" smtClean="0"/>
               <a:pPr/>
-              <a:t>2021-02-22</a:t>
+              <a:t>2021-02-28</a:t>
             </a:fld>
             <a:endParaRPr lang="ko-KR" altLang="en-US"/>
           </a:p>
@@ -807,7 +807,7 @@
             <a:fld id="{00602777-EDDD-4E1C-9A25-53AA0F22EDF3}" type="datetimeFigureOut">
               <a:rPr lang="ko-KR" altLang="en-US" smtClean="0"/>
               <a:pPr/>
-              <a:t>2021-02-22</a:t>
+              <a:t>2021-02-28</a:t>
             </a:fld>
             <a:endParaRPr lang="ko-KR" altLang="en-US"/>
           </a:p>
@@ -1051,7 +1051,7 @@
             <a:fld id="{00602777-EDDD-4E1C-9A25-53AA0F22EDF3}" type="datetimeFigureOut">
               <a:rPr lang="ko-KR" altLang="en-US" smtClean="0"/>
               <a:pPr/>
-              <a:t>2021-02-22</a:t>
+              <a:t>2021-02-28</a:t>
             </a:fld>
             <a:endParaRPr lang="ko-KR" altLang="en-US"/>
           </a:p>
@@ -1317,7 +1317,7 @@
             <a:fld id="{00602777-EDDD-4E1C-9A25-53AA0F22EDF3}" type="datetimeFigureOut">
               <a:rPr lang="ko-KR" altLang="en-US" smtClean="0"/>
               <a:pPr/>
-              <a:t>2021-02-22</a:t>
+              <a:t>2021-02-28</a:t>
             </a:fld>
             <a:endParaRPr lang="ko-KR" altLang="en-US"/>
           </a:p>
@@ -1697,7 +1697,7 @@
             <a:fld id="{00602777-EDDD-4E1C-9A25-53AA0F22EDF3}" type="datetimeFigureOut">
               <a:rPr lang="ko-KR" altLang="en-US" smtClean="0"/>
               <a:pPr/>
-              <a:t>2021-02-22</a:t>
+              <a:t>2021-02-28</a:t>
             </a:fld>
             <a:endParaRPr lang="ko-KR" altLang="en-US"/>
           </a:p>
@@ -1849,7 +1849,7 @@
             <a:fld id="{00602777-EDDD-4E1C-9A25-53AA0F22EDF3}" type="datetimeFigureOut">
               <a:rPr lang="ko-KR" altLang="en-US" smtClean="0"/>
               <a:pPr/>
-              <a:t>2021-02-22</a:t>
+              <a:t>2021-02-28</a:t>
             </a:fld>
             <a:endParaRPr lang="ko-KR" altLang="en-US"/>
           </a:p>
@@ -1941,7 +1941,7 @@
             <a:fld id="{00602777-EDDD-4E1C-9A25-53AA0F22EDF3}" type="datetimeFigureOut">
               <a:rPr lang="ko-KR" altLang="en-US" smtClean="0"/>
               <a:pPr/>
-              <a:t>2021-02-22</a:t>
+              <a:t>2021-02-28</a:t>
             </a:fld>
             <a:endParaRPr lang="ko-KR" altLang="en-US"/>
           </a:p>
@@ -2204,7 +2204,7 @@
             <a:fld id="{00602777-EDDD-4E1C-9A25-53AA0F22EDF3}" type="datetimeFigureOut">
               <a:rPr lang="ko-KR" altLang="en-US" smtClean="0"/>
               <a:pPr/>
-              <a:t>2021-02-22</a:t>
+              <a:t>2021-02-28</a:t>
             </a:fld>
             <a:endParaRPr lang="ko-KR" altLang="en-US"/>
           </a:p>
@@ -2494,7 +2494,7 @@
             <a:fld id="{00602777-EDDD-4E1C-9A25-53AA0F22EDF3}" type="datetimeFigureOut">
               <a:rPr lang="ko-KR" altLang="en-US" smtClean="0"/>
               <a:pPr/>
-              <a:t>2021-02-22</a:t>
+              <a:t>2021-02-28</a:t>
             </a:fld>
             <a:endParaRPr lang="ko-KR" altLang="en-US"/>
           </a:p>
@@ -3267,7 +3267,7 @@
             <a:fld id="{00602777-EDDD-4E1C-9A25-53AA0F22EDF3}" type="datetimeFigureOut">
               <a:rPr lang="ko-KR" altLang="en-US" smtClean="0"/>
               <a:pPr/>
-              <a:t>2021-02-22</a:t>
+              <a:t>2021-02-28</a:t>
             </a:fld>
             <a:endParaRPr lang="ko-KR" altLang="en-US"/>
           </a:p>
@@ -5477,13 +5477,32 @@
         <p:spPr/>
         <p:txBody>
           <a:bodyPr>
-            <a:normAutofit fontScale="40000" lnSpcReduction="20000"/>
+            <a:normAutofit fontScale="32500" lnSpcReduction="20000"/>
           </a:bodyPr>
           <a:lstStyle/>
           <a:p>
             <a:r>
               <a:rPr lang="en-US" altLang="ko-KR" sz="3400" dirty="0" smtClean="0"/>
-              <a:t>maven dependency</a:t>
+              <a:t>Spring-boot</a:t>
+            </a:r>
+          </a:p>
+          <a:p>
+            <a:r>
+              <a:rPr lang="en-US" altLang="ko-KR" sz="3400" dirty="0" smtClean="0"/>
+              <a:t>- version 2.4.2</a:t>
+            </a:r>
+          </a:p>
+          <a:p>
+            <a:endParaRPr lang="en-US" altLang="ko-KR" sz="3400" dirty="0" smtClean="0"/>
+          </a:p>
+          <a:p>
+            <a:r>
+              <a:rPr lang="en-US" altLang="ko-KR" sz="3400" dirty="0" smtClean="0"/>
+              <a:t>maven </a:t>
+            </a:r>
+            <a:r>
+              <a:rPr lang="en-US" altLang="ko-KR" sz="3400" dirty="0" smtClean="0"/>
+              <a:t>dependency</a:t>
             </a:r>
           </a:p>
           <a:p>
@@ -5654,31 +5673,22 @@
           <a:p>
             <a:r>
               <a:rPr lang="en-US" altLang="ko-KR" sz="3400" dirty="0" smtClean="0"/>
-              <a:t>- bootstrap.min.js (Bootstrap4</a:t>
+              <a:t>- bootstrap.min.js (Bootstrap4)</a:t>
+            </a:r>
+          </a:p>
+          <a:p>
+            <a:r>
+              <a:rPr lang="en-US" altLang="ko-KR" sz="3400" dirty="0" smtClean="0"/>
+              <a:t>- summernote-0.8.18 (</a:t>
+            </a:r>
+            <a:r>
+              <a:rPr lang="ko-KR" altLang="en-US" sz="3400" dirty="0" smtClean="0"/>
+              <a:t>텍스트에디터</a:t>
             </a:r>
             <a:r>
               <a:rPr lang="en-US" altLang="ko-KR" sz="3400" dirty="0" smtClean="0"/>
               <a:t>)</a:t>
             </a:r>
-          </a:p>
-          <a:p>
-            <a:r>
-              <a:rPr lang="en-US" altLang="ko-KR" sz="3400" dirty="0" smtClean="0"/>
-              <a:t>- </a:t>
-            </a:r>
-            <a:r>
-              <a:rPr lang="en-US" altLang="ko-KR" sz="3400" dirty="0" smtClean="0"/>
-              <a:t>summernote-0.8.18 (</a:t>
-            </a:r>
-            <a:r>
-              <a:rPr lang="ko-KR" altLang="en-US" sz="3400" dirty="0" smtClean="0"/>
-              <a:t>텍스트에디터</a:t>
-            </a:r>
-            <a:r>
-              <a:rPr lang="en-US" altLang="ko-KR" sz="3400" dirty="0" smtClean="0"/>
-              <a:t>)</a:t>
-            </a:r>
-            <a:endParaRPr lang="en-US" altLang="ko-KR" sz="3400" dirty="0" smtClean="0"/>
           </a:p>
           <a:p>
             <a:endParaRPr lang="en-US" altLang="ko-KR" sz="3400" dirty="0" smtClean="0"/>

</xml_diff>